<commit_message>
ajout du lien vers l'apk dans pptx
</commit_message>
<xml_diff>
--- a/Projet Anglais 2017.pptx
+++ b/Projet Anglais 2017.pptx
@@ -14859,15 +14859,7 @@
             </a:pPr>
             <a:r>
               <a:rPr lang="fr-FR" dirty="0" smtClean="0"/>
-              <a:t>I. </a:t>
-            </a:r>
-            <a:r>
-              <a:rPr lang="fr-FR" dirty="0" smtClean="0"/>
-              <a:t>Goals </a:t>
-            </a:r>
-            <a:r>
-              <a:rPr lang="fr-FR" dirty="0" smtClean="0"/>
-              <a:t>of the application</a:t>
+              <a:t>I. Goals of the application</a:t>
             </a:r>
           </a:p>
           <a:p>
@@ -15103,19 +15095,11 @@
             </a:pPr>
             <a:r>
               <a:rPr lang="fr-FR" dirty="0" smtClean="0"/>
-              <a:t>	</a:t>
-            </a:r>
-            <a:r>
-              <a:rPr lang="fr-FR" dirty="0" smtClean="0"/>
-              <a:t>To </a:t>
+              <a:t>	To </a:t>
             </a:r>
             <a:r>
               <a:rPr lang="fr-FR" dirty="0" err="1" smtClean="0"/>
-              <a:t>m</a:t>
-            </a:r>
-            <a:r>
-              <a:rPr lang="fr-FR" dirty="0" err="1" smtClean="0"/>
-              <a:t>ake</a:t>
+              <a:t>make</a:t>
             </a:r>
             <a:r>
               <a:rPr lang="fr-FR" dirty="0" smtClean="0"/>
@@ -15163,7 +15147,6 @@
               <a:rPr lang="fr-FR" dirty="0" smtClean="0"/>
               <a:t> an attractive solution</a:t>
             </a:r>
-            <a:endParaRPr lang="fr-FR" dirty="0" smtClean="0"/>
           </a:p>
         </p:txBody>
       </p:sp>
@@ -15441,13 +15424,8 @@
             </a:br>
             <a:r>
               <a:rPr lang="fr-FR" dirty="0" smtClean="0"/>
-              <a:t>     </a:t>
+              <a:t>     Inspired by :  Projet Voltaire</a:t>
             </a:r>
-            <a:r>
-              <a:rPr lang="fr-FR" dirty="0" smtClean="0"/>
-              <a:t>Inspired by :  Projet Voltaire</a:t>
-            </a:r>
-            <a:endParaRPr lang="fr-FR" dirty="0" smtClean="0"/>
           </a:p>
           <a:p>
             <a:endParaRPr lang="fr-FR" dirty="0" smtClean="0"/>
@@ -15480,13 +15458,8 @@
             </a:r>
             <a:r>
               <a:rPr lang="fr-FR" dirty="0" smtClean="0"/>
-              <a:t>	   </a:t>
+              <a:t>	   A training : find mistakes in sentences</a:t>
             </a:r>
-            <a:r>
-              <a:rPr lang="fr-FR" dirty="0" smtClean="0"/>
-              <a:t>A training : find mistakes in sentences</a:t>
-            </a:r>
-            <a:endParaRPr lang="fr-FR" dirty="0" smtClean="0"/>
           </a:p>
         </p:txBody>
       </p:sp>
@@ -15724,7 +15697,7 @@
         </p:blipFill>
         <p:spPr bwMode="auto">
           <a:xfrm>
-            <a:off x="3203848" y="3140968"/>
+            <a:off x="3203848" y="2708920"/>
             <a:ext cx="2448272" cy="2276892"/>
           </a:xfrm>
           <a:prstGeom prst="rect">
@@ -15785,7 +15758,7 @@
         <p:spPr>
           <a:xfrm>
             <a:off x="1043608" y="2132856"/>
-            <a:ext cx="6777317" cy="3292953"/>
+            <a:ext cx="6777317" cy="3960440"/>
           </a:xfrm>
         </p:spPr>
         <p:txBody>
@@ -15890,6 +15863,46 @@
             </a:pPr>
             <a:endParaRPr lang="fr-FR" dirty="0" smtClean="0"/>
           </a:p>
+          <a:p>
+            <a:pPr marL="68580" indent="0" algn="ctr">
+              <a:buNone/>
+            </a:pPr>
+            <a:endParaRPr lang="fr-FR" dirty="0"/>
+          </a:p>
+          <a:p>
+            <a:pPr marL="68580" indent="0" algn="ctr">
+              <a:buNone/>
+            </a:pPr>
+            <a:endParaRPr lang="fr-FR" dirty="0" smtClean="0"/>
+          </a:p>
+          <a:p>
+            <a:pPr marL="68580" indent="0" algn="ctr">
+              <a:buNone/>
+            </a:pPr>
+            <a:endParaRPr lang="fr-FR" dirty="0"/>
+          </a:p>
+          <a:p>
+            <a:pPr marL="68580" indent="0" algn="ctr">
+              <a:buNone/>
+            </a:pPr>
+            <a:endParaRPr lang="fr-FR" dirty="0" smtClean="0"/>
+          </a:p>
+          <a:p>
+            <a:pPr marL="68580" indent="0" algn="ctr">
+              <a:buNone/>
+            </a:pPr>
+            <a:endParaRPr lang="fr-FR" dirty="0" smtClean="0"/>
+          </a:p>
+          <a:p>
+            <a:pPr marL="68580" indent="0" algn="ctr">
+              <a:buNone/>
+            </a:pPr>
+            <a:r>
+              <a:rPr lang="fr-FR" sz="2000" dirty="0" smtClean="0"/>
+              <a:t>github.com/EhonAC7S/ProjetAnglais2A</a:t>
+            </a:r>
+            <a:endParaRPr lang="fr-FR" sz="2000" dirty="0" smtClean="0"/>
+          </a:p>
         </p:txBody>
       </p:sp>
       <p:sp>
@@ -15938,7 +15951,7 @@
         </p:blipFill>
         <p:spPr>
           <a:xfrm>
-            <a:off x="3868881" y="3720311"/>
+            <a:off x="3868881" y="3288263"/>
             <a:ext cx="1118206" cy="1118206"/>
           </a:xfrm>
           <a:prstGeom prst="rect">
@@ -16064,7 +16077,6 @@
               <a:rPr lang="fr-FR" dirty="0" smtClean="0"/>
               <a:t>Creation tools :</a:t>
             </a:r>
-            <a:endParaRPr lang="fr-FR" dirty="0" smtClean="0"/>
           </a:p>
         </p:txBody>
       </p:sp>
@@ -16449,11 +16461,7 @@
             </a:pPr>
             <a:r>
               <a:rPr lang="fr-FR" dirty="0" smtClean="0"/>
-              <a:t>C</a:t>
-            </a:r>
-            <a:r>
-              <a:rPr lang="fr-FR" dirty="0" smtClean="0"/>
-              <a:t>hallenging </a:t>
+              <a:t>Challenging </a:t>
             </a:r>
             <a:r>
               <a:rPr lang="fr-FR" dirty="0"/>

</xml_diff>